<commit_message>
bcrypt sample fixed and presentation updated
</commit_message>
<xml_diff>
--- a/files/Temel Web Güvenliği.pptx
+++ b/files/Temel Web Güvenliği.pptx
@@ -14,8 +14,8 @@
     <p:sldId id="270" r:id="rId5"/>
     <p:sldId id="258" r:id="rId6"/>
     <p:sldId id="261" r:id="rId7"/>
-    <p:sldId id="257" r:id="rId8"/>
-    <p:sldId id="266" r:id="rId9"/>
+    <p:sldId id="266" r:id="rId8"/>
+    <p:sldId id="257" r:id="rId9"/>
     <p:sldId id="269" r:id="rId10"/>
     <p:sldId id="268" r:id="rId11"/>
   </p:sldIdLst>
@@ -120,6 +120,9 @@
     <p:ext uri="{EFAFB233-063F-42B5-8137-9DF3F51BA10A}">
       <p15:sldGuideLst xmlns:p15="http://schemas.microsoft.com/office/powerpoint/2012/main"/>
     </p:ext>
+    <p:ext uri="{2D200454-40CA-4A62-9FC3-DE9A4176ACB9}">
+      <p15:notesGuideLst xmlns:p15="http://schemas.microsoft.com/office/powerpoint/2012/main"/>
+    </p:ext>
   </p:extLst>
 </p:presentation>
 </file>
@@ -206,7 +209,7 @@
           <a:p>
             <a:fld id="{9B000B89-0F36-4885-8B0D-565B79FF94F9}" type="datetimeFigureOut">
               <a:rPr lang="tr-TR" smtClean="0"/>
-              <a:t>26.10.2013</a:t>
+              <a:t>29.10.2013</a:t>
             </a:fld>
             <a:endParaRPr lang="tr-TR"/>
           </a:p>
@@ -518,6 +521,90 @@
           <a:bodyPr/>
           <a:lstStyle/>
           <a:p>
+            <a:endParaRPr lang="tr-TR" dirty="0"/>
+          </a:p>
+        </p:txBody>
+      </p:sp>
+      <p:sp>
+        <p:nvSpPr>
+          <p:cNvPr id="4" name="Slide Number Placeholder 3"/>
+          <p:cNvSpPr>
+            <a:spLocks noGrp="1"/>
+          </p:cNvSpPr>
+          <p:nvPr>
+            <p:ph type="sldNum" sz="quarter" idx="10"/>
+          </p:nvPr>
+        </p:nvSpPr>
+        <p:spPr/>
+        <p:txBody>
+          <a:bodyPr/>
+          <a:lstStyle/>
+          <a:p>
+            <a:fld id="{3D18B52D-FAA3-4972-8BC0-F6CEC2746CE5}" type="slidenum">
+              <a:rPr lang="tr-TR" smtClean="0"/>
+              <a:t>2</a:t>
+            </a:fld>
+            <a:endParaRPr lang="tr-TR"/>
+          </a:p>
+        </p:txBody>
+      </p:sp>
+    </p:spTree>
+    <p:extLst>
+      <p:ext uri="{BB962C8B-B14F-4D97-AF65-F5344CB8AC3E}">
+        <p14:creationId xmlns:p14="http://schemas.microsoft.com/office/powerpoint/2010/main" val="2347867868"/>
+      </p:ext>
+    </p:extLst>
+  </p:cSld>
+  <p:clrMapOvr>
+    <a:masterClrMapping/>
+  </p:clrMapOvr>
+</p:notes>
+</file>
+
+<file path=ppt/notesSlides/notesSlide2.xml><?xml version="1.0" encoding="utf-8"?>
+<p:notes xmlns:a="http://schemas.openxmlformats.org/drawingml/2006/main" xmlns:r="http://schemas.openxmlformats.org/officeDocument/2006/relationships" xmlns:p="http://schemas.openxmlformats.org/presentationml/2006/main">
+  <p:cSld>
+    <p:spTree>
+      <p:nvGrpSpPr>
+        <p:cNvPr id="1" name=""/>
+        <p:cNvGrpSpPr/>
+        <p:nvPr/>
+      </p:nvGrpSpPr>
+      <p:grpSpPr>
+        <a:xfrm>
+          <a:off x="0" y="0"/>
+          <a:ext cx="0" cy="0"/>
+          <a:chOff x="0" y="0"/>
+          <a:chExt cx="0" cy="0"/>
+        </a:xfrm>
+      </p:grpSpPr>
+      <p:sp>
+        <p:nvSpPr>
+          <p:cNvPr id="2" name="Slide Image Placeholder 1"/>
+          <p:cNvSpPr>
+            <a:spLocks noGrp="1" noRot="1" noChangeAspect="1"/>
+          </p:cNvSpPr>
+          <p:nvPr>
+            <p:ph type="sldImg"/>
+          </p:nvPr>
+        </p:nvSpPr>
+        <p:spPr/>
+      </p:sp>
+      <p:sp>
+        <p:nvSpPr>
+          <p:cNvPr id="3" name="Notes Placeholder 2"/>
+          <p:cNvSpPr>
+            <a:spLocks noGrp="1"/>
+          </p:cNvSpPr>
+          <p:nvPr>
+            <p:ph type="body" idx="1"/>
+          </p:nvPr>
+        </p:nvSpPr>
+        <p:spPr/>
+        <p:txBody>
+          <a:bodyPr/>
+          <a:lstStyle/>
+          <a:p>
             <a:r>
               <a:rPr lang="tr-TR" dirty="0" smtClean="0"/>
               <a:t>Tarayıcı-&gt;Sunucu: </a:t>
@@ -690,7 +777,7 @@
 </p:notes>
 </file>
 
-<file path=ppt/notesSlides/notesSlide2.xml><?xml version="1.0" encoding="utf-8"?>
+<file path=ppt/notesSlides/notesSlide3.xml><?xml version="1.0" encoding="utf-8"?>
 <p:notes xmlns:a="http://schemas.openxmlformats.org/drawingml/2006/main" xmlns:r="http://schemas.openxmlformats.org/officeDocument/2006/relationships" xmlns:p="http://schemas.openxmlformats.org/presentationml/2006/main">
   <p:cSld>
     <p:spTree>
@@ -973,7 +1060,7 @@
           <a:p>
             <a:fld id="{B00EEF38-224F-4756-85F6-AF54F40E46E0}" type="datetimeFigureOut">
               <a:rPr lang="tr-TR" smtClean="0"/>
-              <a:t>26.10.2013</a:t>
+              <a:t>29.10.2013</a:t>
             </a:fld>
             <a:endParaRPr lang="tr-TR"/>
           </a:p>
@@ -1143,7 +1230,7 @@
           <a:p>
             <a:fld id="{B00EEF38-224F-4756-85F6-AF54F40E46E0}" type="datetimeFigureOut">
               <a:rPr lang="tr-TR" smtClean="0"/>
-              <a:t>26.10.2013</a:t>
+              <a:t>29.10.2013</a:t>
             </a:fld>
             <a:endParaRPr lang="tr-TR"/>
           </a:p>
@@ -1323,7 +1410,7 @@
           <a:p>
             <a:fld id="{B00EEF38-224F-4756-85F6-AF54F40E46E0}" type="datetimeFigureOut">
               <a:rPr lang="tr-TR" smtClean="0"/>
-              <a:t>26.10.2013</a:t>
+              <a:t>29.10.2013</a:t>
             </a:fld>
             <a:endParaRPr lang="tr-TR"/>
           </a:p>
@@ -1493,7 +1580,7 @@
           <a:p>
             <a:fld id="{B00EEF38-224F-4756-85F6-AF54F40E46E0}" type="datetimeFigureOut">
               <a:rPr lang="tr-TR" smtClean="0"/>
-              <a:t>26.10.2013</a:t>
+              <a:t>29.10.2013</a:t>
             </a:fld>
             <a:endParaRPr lang="tr-TR"/>
           </a:p>
@@ -1739,7 +1826,7 @@
           <a:p>
             <a:fld id="{B00EEF38-224F-4756-85F6-AF54F40E46E0}" type="datetimeFigureOut">
               <a:rPr lang="tr-TR" smtClean="0"/>
-              <a:t>26.10.2013</a:t>
+              <a:t>29.10.2013</a:t>
             </a:fld>
             <a:endParaRPr lang="tr-TR"/>
           </a:p>
@@ -1971,7 +2058,7 @@
           <a:p>
             <a:fld id="{B00EEF38-224F-4756-85F6-AF54F40E46E0}" type="datetimeFigureOut">
               <a:rPr lang="tr-TR" smtClean="0"/>
-              <a:t>26.10.2013</a:t>
+              <a:t>29.10.2013</a:t>
             </a:fld>
             <a:endParaRPr lang="tr-TR"/>
           </a:p>
@@ -2338,7 +2425,7 @@
           <a:p>
             <a:fld id="{B00EEF38-224F-4756-85F6-AF54F40E46E0}" type="datetimeFigureOut">
               <a:rPr lang="tr-TR" smtClean="0"/>
-              <a:t>26.10.2013</a:t>
+              <a:t>29.10.2013</a:t>
             </a:fld>
             <a:endParaRPr lang="tr-TR"/>
           </a:p>
@@ -2456,7 +2543,7 @@
           <a:p>
             <a:fld id="{B00EEF38-224F-4756-85F6-AF54F40E46E0}" type="datetimeFigureOut">
               <a:rPr lang="tr-TR" smtClean="0"/>
-              <a:t>26.10.2013</a:t>
+              <a:t>29.10.2013</a:t>
             </a:fld>
             <a:endParaRPr lang="tr-TR"/>
           </a:p>
@@ -2551,7 +2638,7 @@
           <a:p>
             <a:fld id="{B00EEF38-224F-4756-85F6-AF54F40E46E0}" type="datetimeFigureOut">
               <a:rPr lang="tr-TR" smtClean="0"/>
-              <a:t>26.10.2013</a:t>
+              <a:t>29.10.2013</a:t>
             </a:fld>
             <a:endParaRPr lang="tr-TR"/>
           </a:p>
@@ -2828,7 +2915,7 @@
           <a:p>
             <a:fld id="{B00EEF38-224F-4756-85F6-AF54F40E46E0}" type="datetimeFigureOut">
               <a:rPr lang="tr-TR" smtClean="0"/>
-              <a:t>26.10.2013</a:t>
+              <a:t>29.10.2013</a:t>
             </a:fld>
             <a:endParaRPr lang="tr-TR"/>
           </a:p>
@@ -3081,7 +3168,7 @@
           <a:p>
             <a:fld id="{B00EEF38-224F-4756-85F6-AF54F40E46E0}" type="datetimeFigureOut">
               <a:rPr lang="tr-TR" smtClean="0"/>
-              <a:t>26.10.2013</a:t>
+              <a:t>29.10.2013</a:t>
             </a:fld>
             <a:endParaRPr lang="tr-TR"/>
           </a:p>
@@ -3294,7 +3381,7 @@
           <a:p>
             <a:fld id="{B00EEF38-224F-4756-85F6-AF54F40E46E0}" type="datetimeFigureOut">
               <a:rPr lang="tr-TR" smtClean="0"/>
-              <a:t>26.10.2013</a:t>
+              <a:t>29.10.2013</a:t>
             </a:fld>
             <a:endParaRPr lang="tr-TR"/>
           </a:p>
@@ -3861,14 +3948,59 @@
               </a:rPr>
               <a:t>www.troyhunt.com/2011/12/free-ebook-owasp-top-10-for-net.html</a:t>
             </a:r>
-            <a:endParaRPr lang="tr-TR" dirty="0"/>
+            <a:endParaRPr lang="tr-TR" dirty="0" smtClean="0"/>
           </a:p>
           <a:p>
             <a:r>
               <a:rPr lang="tr-TR" dirty="0">
                 <a:hlinkClick r:id="rId4"/>
               </a:rPr>
-              <a:t>http://www.serdarb.com/security/where-you-can-start-learning-web-application-security/</a:t>
+              <a:t>https://www.mavitunasecurity.com/blog/owasp-top-10-2013</a:t>
+            </a:r>
+            <a:r>
+              <a:rPr lang="tr-TR" dirty="0" smtClean="0">
+                <a:hlinkClick r:id="rId4"/>
+              </a:rPr>
+              <a:t>/</a:t>
+            </a:r>
+            <a:endParaRPr lang="tr-TR" dirty="0" smtClean="0"/>
+          </a:p>
+          <a:p>
+            <a:r>
+              <a:rPr lang="tr-TR" dirty="0">
+                <a:hlinkClick r:id="rId5"/>
+              </a:rPr>
+              <a:t>https://www.mavitunasecurity.com/blog/analysis-web-application-vulnerabilities</a:t>
+            </a:r>
+            <a:r>
+              <a:rPr lang="tr-TR" dirty="0" smtClean="0">
+                <a:hlinkClick r:id="rId5"/>
+              </a:rPr>
+              <a:t>/</a:t>
+            </a:r>
+            <a:endParaRPr lang="tr-TR" dirty="0"/>
+          </a:p>
+          <a:p>
+            <a:r>
+              <a:rPr lang="tr-TR" dirty="0">
+                <a:hlinkClick r:id="rId6"/>
+              </a:rPr>
+              <a:t>http://www.serdarb.com/security/where-you-can-start-learning-web-application-security</a:t>
+            </a:r>
+            <a:r>
+              <a:rPr lang="tr-TR" dirty="0" smtClean="0">
+                <a:hlinkClick r:id="rId6"/>
+              </a:rPr>
+              <a:t>/</a:t>
+            </a:r>
+            <a:endParaRPr lang="tr-TR" dirty="0" smtClean="0"/>
+          </a:p>
+          <a:p>
+            <a:r>
+              <a:rPr lang="tr-TR" dirty="0">
+                <a:hlinkClick r:id="rId7"/>
+              </a:rPr>
+              <a:t>http://www.scantosecure.com/</a:t>
             </a:r>
             <a:endParaRPr lang="tr-TR" dirty="0"/>
           </a:p>
@@ -3940,7 +4072,7 @@
         <p:spPr/>
         <p:txBody>
           <a:bodyPr>
-            <a:normAutofit fontScale="92500" lnSpcReduction="20000"/>
+            <a:normAutofit fontScale="77500" lnSpcReduction="20000"/>
           </a:bodyPr>
           <a:lstStyle/>
           <a:p>
@@ -4008,7 +4140,23 @@
             </a:r>
             <a:r>
               <a:rPr lang="en-US" dirty="0"/>
-              <a:t> Redirects and Forwards</a:t>
+              <a:t> Redirects and </a:t>
+            </a:r>
+            <a:r>
+              <a:rPr lang="en-US" dirty="0" smtClean="0"/>
+              <a:t>Forwards</a:t>
+            </a:r>
+            <a:endParaRPr lang="tr-TR" dirty="0" smtClean="0"/>
+          </a:p>
+          <a:p>
+            <a:endParaRPr lang="tr-TR" dirty="0"/>
+          </a:p>
+          <a:p>
+            <a:r>
+              <a:rPr lang="tr-TR" dirty="0">
+                <a:hlinkClick r:id="rId3"/>
+              </a:rPr>
+              <a:t>https://www.mavitunasecurity.com/blog/owasp-top-10-2013/</a:t>
             </a:r>
             <a:endParaRPr lang="tr-TR" dirty="0"/>
           </a:p>
@@ -4730,22 +4878,9 @@
           <a:lstStyle/>
           <a:p>
             <a:r>
-              <a:rPr lang="tr-TR" dirty="0" smtClean="0"/>
-              <a:t>CSRF – Cross Site </a:t>
-            </a:r>
-            <a:r>
-              <a:rPr lang="tr-TR" dirty="0" err="1" smtClean="0"/>
-              <a:t>Request</a:t>
-            </a:r>
-            <a:r>
-              <a:rPr lang="tr-TR" dirty="0" smtClean="0"/>
-              <a:t> </a:t>
-            </a:r>
-            <a:r>
-              <a:rPr lang="tr-TR" dirty="0" err="1" smtClean="0"/>
-              <a:t>Forgery</a:t>
-            </a:r>
-            <a:endParaRPr lang="tr-TR" dirty="0"/>
+              <a:rPr lang="tr-TR" dirty="0"/>
+              <a:t>XSS – Cross Site Scripting</a:t>
+            </a:r>
           </a:p>
         </p:txBody>
       </p:sp>
@@ -4767,41 +4902,39 @@
           <a:lstStyle/>
           <a:p>
             <a:r>
-              <a:rPr lang="tr-TR" sz="3600" dirty="0" smtClean="0"/>
-              <a:t>Kullanıcınız </a:t>
-            </a:r>
-            <a:r>
-              <a:rPr lang="tr-TR" sz="3600" dirty="0" err="1" smtClean="0"/>
-              <a:t>login</a:t>
-            </a:r>
-            <a:r>
-              <a:rPr lang="tr-TR" sz="3600" dirty="0" smtClean="0"/>
-              <a:t> durumdayken, başka bir uygulamanın sizin uygulamanıza o kullanıcı üzerinden işlem yapabilmesidir</a:t>
-            </a:r>
-            <a:r>
-              <a:rPr lang="tr-TR" sz="3600" dirty="0" smtClean="0"/>
-              <a:t>.</a:t>
-            </a:r>
-          </a:p>
-          <a:p>
-            <a:endParaRPr lang="tr-TR" sz="3600" dirty="0"/>
-          </a:p>
-          <a:p>
-            <a:r>
-              <a:rPr lang="tr-TR" sz="3600" dirty="0" smtClean="0"/>
-              <a:t>DEMO </a:t>
-            </a:r>
-            <a:endParaRPr lang="tr-TR" sz="3600" dirty="0" smtClean="0"/>
-          </a:p>
-          <a:p>
-            <a:endParaRPr lang="tr-TR" sz="3600" dirty="0"/>
+              <a:rPr lang="tr-TR" dirty="0" smtClean="0"/>
+              <a:t>Kullanıcılara sunulan sayfalara, istenmeyen bir </a:t>
+            </a:r>
+            <a:r>
+              <a:rPr lang="tr-TR" dirty="0" err="1" smtClean="0"/>
+              <a:t>scriptin</a:t>
+            </a:r>
+            <a:r>
+              <a:rPr lang="tr-TR" dirty="0" smtClean="0"/>
+              <a:t> eklenmesi ve diğer kullanıcılar sayfayı açtığında da çalıştırılması sonucunda oluşan durumdur.</a:t>
+            </a:r>
+          </a:p>
+          <a:p>
+            <a:r>
+              <a:rPr lang="tr-TR" dirty="0" smtClean="0"/>
+              <a:t>Kullanıcıdan alıp ekrana bastığımız bir bilgi mutlaka kontrolden geçirilmelidir!</a:t>
+            </a:r>
+          </a:p>
+          <a:p>
+            <a:endParaRPr lang="tr-TR" dirty="0"/>
+          </a:p>
+          <a:p>
+            <a:r>
+              <a:rPr lang="tr-TR" dirty="0"/>
+              <a:t>DEMO</a:t>
+            </a:r>
           </a:p>
         </p:txBody>
       </p:sp>
     </p:spTree>
     <p:extLst>
       <p:ext uri="{BB962C8B-B14F-4D97-AF65-F5344CB8AC3E}">
-        <p14:creationId xmlns:p14="http://schemas.microsoft.com/office/powerpoint/2010/main" val="4144240290"/>
+        <p14:creationId xmlns:p14="http://schemas.microsoft.com/office/powerpoint/2010/main" val="42645901"/>
       </p:ext>
     </p:extLst>
   </p:cSld>
@@ -4844,9 +4977,22 @@
           <a:lstStyle/>
           <a:p>
             <a:r>
-              <a:rPr lang="tr-TR" dirty="0"/>
-              <a:t>XSS – Cross Site Scripting</a:t>
-            </a:r>
+              <a:rPr lang="tr-TR" dirty="0" smtClean="0"/>
+              <a:t>CSRF – Cross Site </a:t>
+            </a:r>
+            <a:r>
+              <a:rPr lang="tr-TR" dirty="0" err="1" smtClean="0"/>
+              <a:t>Request</a:t>
+            </a:r>
+            <a:r>
+              <a:rPr lang="tr-TR" dirty="0" smtClean="0"/>
+              <a:t> </a:t>
+            </a:r>
+            <a:r>
+              <a:rPr lang="tr-TR" dirty="0" err="1" smtClean="0"/>
+              <a:t>Forgery</a:t>
+            </a:r>
+            <a:endParaRPr lang="tr-TR" dirty="0"/>
           </a:p>
         </p:txBody>
       </p:sp>
@@ -4868,39 +5014,36 @@
           <a:lstStyle/>
           <a:p>
             <a:r>
-              <a:rPr lang="tr-TR" dirty="0" smtClean="0"/>
-              <a:t>Kullanıcılara sunulan sayfalara, istenmeyen bir </a:t>
-            </a:r>
-            <a:r>
-              <a:rPr lang="tr-TR" dirty="0" err="1" smtClean="0"/>
-              <a:t>scriptin</a:t>
-            </a:r>
-            <a:r>
-              <a:rPr lang="tr-TR" dirty="0" smtClean="0"/>
-              <a:t> eklenmesi ve diğer kullanıcılar sayfayı açtığında da çalıştırılması sonucunda oluşan durumdur.</a:t>
-            </a:r>
-          </a:p>
-          <a:p>
-            <a:r>
-              <a:rPr lang="tr-TR" dirty="0" smtClean="0"/>
-              <a:t>Kullanıcıdan alıp ekrana bastığımız bir bilgi mutlaka kontrolden geçirilmelidir!</a:t>
-            </a:r>
-          </a:p>
-          <a:p>
-            <a:endParaRPr lang="tr-TR" dirty="0"/>
-          </a:p>
-          <a:p>
-            <a:r>
-              <a:rPr lang="tr-TR" dirty="0"/>
-              <a:t>DEMO</a:t>
-            </a:r>
+              <a:rPr lang="tr-TR" sz="3600" dirty="0" smtClean="0"/>
+              <a:t>Kullanıcınız </a:t>
+            </a:r>
+            <a:r>
+              <a:rPr lang="tr-TR" sz="3600" dirty="0" err="1" smtClean="0"/>
+              <a:t>login</a:t>
+            </a:r>
+            <a:r>
+              <a:rPr lang="tr-TR" sz="3600" dirty="0" smtClean="0"/>
+              <a:t> durumdayken, başka bir uygulamanın sizin uygulamanıza o kullanıcı üzerinden işlem yapabilmesidir.</a:t>
+            </a:r>
+          </a:p>
+          <a:p>
+            <a:endParaRPr lang="tr-TR" sz="3600" dirty="0"/>
+          </a:p>
+          <a:p>
+            <a:r>
+              <a:rPr lang="tr-TR" sz="3600" dirty="0" smtClean="0"/>
+              <a:t>DEMO </a:t>
+            </a:r>
+          </a:p>
+          <a:p>
+            <a:endParaRPr lang="tr-TR" sz="3600" dirty="0"/>
           </a:p>
         </p:txBody>
       </p:sp>
     </p:spTree>
     <p:extLst>
       <p:ext uri="{BB962C8B-B14F-4D97-AF65-F5344CB8AC3E}">
-        <p14:creationId xmlns:p14="http://schemas.microsoft.com/office/powerpoint/2010/main" val="42645901"/>
+        <p14:creationId xmlns:p14="http://schemas.microsoft.com/office/powerpoint/2010/main" val="4144240290"/>
       </p:ext>
     </p:extLst>
   </p:cSld>

</xml_diff>